<commit_message>
work on ML algo
</commit_message>
<xml_diff>
--- a/ML Algorithm/Ensemble Technique/Ensemble Technique.pptx
+++ b/ML Algorithm/Ensemble Technique/Ensemble Technique.pptx
@@ -264,7 +264,7 @@
           <a:p>
             <a:fld id="{71DC98BF-09C1-41AD-A7DB-751482C80D6E}" type="datetimeFigureOut">
               <a:rPr lang="en-US" smtClean="0"/>
-              <a:t>11/17/2021</a:t>
+              <a:t>10/8/2023</a:t>
             </a:fld>
             <a:endParaRPr lang="en-US"/>
           </a:p>
@@ -462,7 +462,7 @@
           <a:p>
             <a:fld id="{71DC98BF-09C1-41AD-A7DB-751482C80D6E}" type="datetimeFigureOut">
               <a:rPr lang="en-US" smtClean="0"/>
-              <a:t>11/17/2021</a:t>
+              <a:t>10/8/2023</a:t>
             </a:fld>
             <a:endParaRPr lang="en-US"/>
           </a:p>
@@ -670,7 +670,7 @@
           <a:p>
             <a:fld id="{71DC98BF-09C1-41AD-A7DB-751482C80D6E}" type="datetimeFigureOut">
               <a:rPr lang="en-US" smtClean="0"/>
-              <a:t>11/17/2021</a:t>
+              <a:t>10/8/2023</a:t>
             </a:fld>
             <a:endParaRPr lang="en-US"/>
           </a:p>
@@ -868,7 +868,7 @@
           <a:p>
             <a:fld id="{71DC98BF-09C1-41AD-A7DB-751482C80D6E}" type="datetimeFigureOut">
               <a:rPr lang="en-US" smtClean="0"/>
-              <a:t>11/17/2021</a:t>
+              <a:t>10/8/2023</a:t>
             </a:fld>
             <a:endParaRPr lang="en-US"/>
           </a:p>
@@ -1143,7 +1143,7 @@
           <a:p>
             <a:fld id="{71DC98BF-09C1-41AD-A7DB-751482C80D6E}" type="datetimeFigureOut">
               <a:rPr lang="en-US" smtClean="0"/>
-              <a:t>11/17/2021</a:t>
+              <a:t>10/8/2023</a:t>
             </a:fld>
             <a:endParaRPr lang="en-US"/>
           </a:p>
@@ -1408,7 +1408,7 @@
           <a:p>
             <a:fld id="{71DC98BF-09C1-41AD-A7DB-751482C80D6E}" type="datetimeFigureOut">
               <a:rPr lang="en-US" smtClean="0"/>
-              <a:t>11/17/2021</a:t>
+              <a:t>10/8/2023</a:t>
             </a:fld>
             <a:endParaRPr lang="en-US"/>
           </a:p>
@@ -1820,7 +1820,7 @@
           <a:p>
             <a:fld id="{71DC98BF-09C1-41AD-A7DB-751482C80D6E}" type="datetimeFigureOut">
               <a:rPr lang="en-US" smtClean="0"/>
-              <a:t>11/17/2021</a:t>
+              <a:t>10/8/2023</a:t>
             </a:fld>
             <a:endParaRPr lang="en-US"/>
           </a:p>
@@ -1961,7 +1961,7 @@
           <a:p>
             <a:fld id="{71DC98BF-09C1-41AD-A7DB-751482C80D6E}" type="datetimeFigureOut">
               <a:rPr lang="en-US" smtClean="0"/>
-              <a:t>11/17/2021</a:t>
+              <a:t>10/8/2023</a:t>
             </a:fld>
             <a:endParaRPr lang="en-US"/>
           </a:p>
@@ -2074,7 +2074,7 @@
           <a:p>
             <a:fld id="{71DC98BF-09C1-41AD-A7DB-751482C80D6E}" type="datetimeFigureOut">
               <a:rPr lang="en-US" smtClean="0"/>
-              <a:t>11/17/2021</a:t>
+              <a:t>10/8/2023</a:t>
             </a:fld>
             <a:endParaRPr lang="en-US"/>
           </a:p>
@@ -2385,7 +2385,7 @@
           <a:p>
             <a:fld id="{71DC98BF-09C1-41AD-A7DB-751482C80D6E}" type="datetimeFigureOut">
               <a:rPr lang="en-US" smtClean="0"/>
-              <a:t>11/17/2021</a:t>
+              <a:t>10/8/2023</a:t>
             </a:fld>
             <a:endParaRPr lang="en-US"/>
           </a:p>
@@ -2673,7 +2673,7 @@
           <a:p>
             <a:fld id="{71DC98BF-09C1-41AD-A7DB-751482C80D6E}" type="datetimeFigureOut">
               <a:rPr lang="en-US" smtClean="0"/>
-              <a:t>11/17/2021</a:t>
+              <a:t>10/8/2023</a:t>
             </a:fld>
             <a:endParaRPr lang="en-US"/>
           </a:p>
@@ -2914,7 +2914,7 @@
           <a:p>
             <a:fld id="{71DC98BF-09C1-41AD-A7DB-751482C80D6E}" type="datetimeFigureOut">
               <a:rPr lang="en-US" smtClean="0"/>
-              <a:t>11/17/2021</a:t>
+              <a:t>10/8/2023</a:t>
             </a:fld>
             <a:endParaRPr lang="en-US"/>
           </a:p>
@@ -4803,312 +4803,767 @@
           </a:p>
         </p:txBody>
       </p:sp>
-      <p:grpSp>
-        <p:nvGrpSpPr>
-          <p:cNvPr id="4" name="Group 3">
+      <p:sp>
+        <p:nvSpPr>
+          <p:cNvPr id="5" name="TextBox 4">
             <a:extLst>
               <a:ext uri="{FF2B5EF4-FFF2-40B4-BE49-F238E27FC236}">
-                <a16:creationId xmlns:a16="http://schemas.microsoft.com/office/drawing/2014/main" id="{ECA60118-F888-438D-A9D0-9A1D2778A4D9}"/>
+                <a16:creationId xmlns:a16="http://schemas.microsoft.com/office/drawing/2014/main" id="{9342B4EF-CD55-4342-A131-5DC21D7F25A8}"/>
               </a:ext>
             </a:extLst>
           </p:cNvPr>
-          <p:cNvGrpSpPr/>
+          <p:cNvSpPr txBox="1"/>
           <p:nvPr/>
-        </p:nvGrpSpPr>
-        <p:grpSpPr>
+        </p:nvSpPr>
+        <p:spPr>
           <a:xfrm>
-            <a:off x="3639744" y="3880624"/>
-            <a:ext cx="3829314" cy="2149752"/>
-            <a:chOff x="3896221" y="1839951"/>
-            <a:chExt cx="3829314" cy="2149752"/>
+            <a:off x="3542485" y="3852454"/>
+            <a:ext cx="2361800" cy="400110"/>
           </a:xfrm>
-        </p:grpSpPr>
-        <p:sp>
-          <p:nvSpPr>
-            <p:cNvPr id="5" name="TextBox 4">
-              <a:extLst>
-                <a:ext uri="{FF2B5EF4-FFF2-40B4-BE49-F238E27FC236}">
-                  <a16:creationId xmlns:a16="http://schemas.microsoft.com/office/drawing/2014/main" id="{9342B4EF-CD55-4342-A131-5DC21D7F25A8}"/>
-                </a:ext>
-              </a:extLst>
-            </p:cNvPr>
-            <p:cNvSpPr txBox="1"/>
-            <p:nvPr/>
-          </p:nvSpPr>
-          <p:spPr>
-            <a:xfrm>
-              <a:off x="4672361" y="1839951"/>
-              <a:ext cx="2361800" cy="400110"/>
-            </a:xfrm>
-            <a:prstGeom prst="rect">
-              <a:avLst/>
-            </a:prstGeom>
-            <a:noFill/>
-          </p:spPr>
-          <p:txBody>
-            <a:bodyPr wrap="none" rtlCol="0">
-              <a:spAutoFit/>
-            </a:bodyPr>
-            <a:lstStyle/>
-            <a:p>
-              <a:r>
-                <a:rPr lang="en-US" sz="2000" b="1" dirty="0"/>
-                <a:t>Ensemble Technique</a:t>
-              </a:r>
-            </a:p>
-          </p:txBody>
-        </p:sp>
-        <p:cxnSp>
-          <p:nvCxnSpPr>
-            <p:cNvPr id="6" name="Straight Arrow Connector 5">
-              <a:extLst>
-                <a:ext uri="{FF2B5EF4-FFF2-40B4-BE49-F238E27FC236}">
-                  <a16:creationId xmlns:a16="http://schemas.microsoft.com/office/drawing/2014/main" id="{7B0EC243-D8A7-4F2A-A096-CEE341E8B716}"/>
-                </a:ext>
-              </a:extLst>
-            </p:cNvPr>
-            <p:cNvCxnSpPr>
-              <a:cxnSpLocks/>
-              <a:stCxn id="5" idx="2"/>
-            </p:cNvCxnSpPr>
-            <p:nvPr/>
-          </p:nvCxnSpPr>
-          <p:spPr>
-            <a:xfrm>
-              <a:off x="5853261" y="2240061"/>
-              <a:ext cx="0" cy="347022"/>
-            </a:xfrm>
-            <a:prstGeom prst="straightConnector1">
-              <a:avLst/>
-            </a:prstGeom>
-            <a:ln w="28575">
-              <a:tailEnd type="triangle"/>
-            </a:ln>
-          </p:spPr>
-          <p:style>
-            <a:lnRef idx="1">
-              <a:schemeClr val="dk1"/>
-            </a:lnRef>
-            <a:fillRef idx="0">
-              <a:schemeClr val="dk1"/>
-            </a:fillRef>
-            <a:effectRef idx="0">
-              <a:schemeClr val="dk1"/>
-            </a:effectRef>
-            <a:fontRef idx="minor">
-              <a:schemeClr val="tx1"/>
-            </a:fontRef>
-          </p:style>
-        </p:cxnSp>
-        <p:cxnSp>
-          <p:nvCxnSpPr>
-            <p:cNvPr id="7" name="Straight Connector 6">
-              <a:extLst>
-                <a:ext uri="{FF2B5EF4-FFF2-40B4-BE49-F238E27FC236}">
-                  <a16:creationId xmlns:a16="http://schemas.microsoft.com/office/drawing/2014/main" id="{09DC0F98-3B00-4B2E-A863-7F9B6B174277}"/>
-                </a:ext>
-              </a:extLst>
-            </p:cNvPr>
-            <p:cNvCxnSpPr>
-              <a:cxnSpLocks/>
-            </p:cNvCxnSpPr>
-            <p:nvPr/>
-          </p:nvCxnSpPr>
-          <p:spPr>
-            <a:xfrm>
-              <a:off x="4587597" y="2587083"/>
-              <a:ext cx="2446564" cy="0"/>
-            </a:xfrm>
-            <a:prstGeom prst="line">
-              <a:avLst/>
-            </a:prstGeom>
-            <a:ln w="28575"/>
-          </p:spPr>
-          <p:style>
-            <a:lnRef idx="1">
-              <a:schemeClr val="dk1"/>
-            </a:lnRef>
-            <a:fillRef idx="0">
-              <a:schemeClr val="dk1"/>
-            </a:fillRef>
-            <a:effectRef idx="0">
-              <a:schemeClr val="dk1"/>
-            </a:effectRef>
-            <a:fontRef idx="minor">
-              <a:schemeClr val="tx1"/>
-            </a:fontRef>
-          </p:style>
-        </p:cxnSp>
-        <p:cxnSp>
-          <p:nvCxnSpPr>
-            <p:cNvPr id="8" name="Straight Arrow Connector 7">
-              <a:extLst>
-                <a:ext uri="{FF2B5EF4-FFF2-40B4-BE49-F238E27FC236}">
-                  <a16:creationId xmlns:a16="http://schemas.microsoft.com/office/drawing/2014/main" id="{4E932C22-50D9-4301-8DE3-46F60F33F292}"/>
-                </a:ext>
-              </a:extLst>
-            </p:cNvPr>
-            <p:cNvCxnSpPr/>
-            <p:nvPr/>
-          </p:nvCxnSpPr>
-          <p:spPr>
-            <a:xfrm>
-              <a:off x="4587597" y="2564568"/>
-              <a:ext cx="0" cy="501805"/>
-            </a:xfrm>
-            <a:prstGeom prst="straightConnector1">
-              <a:avLst/>
-            </a:prstGeom>
-            <a:ln w="28575">
-              <a:tailEnd type="triangle"/>
-            </a:ln>
-          </p:spPr>
-          <p:style>
-            <a:lnRef idx="1">
-              <a:schemeClr val="dk1"/>
-            </a:lnRef>
-            <a:fillRef idx="0">
-              <a:schemeClr val="dk1"/>
-            </a:fillRef>
-            <a:effectRef idx="0">
-              <a:schemeClr val="dk1"/>
-            </a:effectRef>
-            <a:fontRef idx="minor">
-              <a:schemeClr val="tx1"/>
-            </a:fontRef>
-          </p:style>
-        </p:cxnSp>
-        <p:cxnSp>
-          <p:nvCxnSpPr>
-            <p:cNvPr id="9" name="Straight Arrow Connector 8">
-              <a:extLst>
-                <a:ext uri="{FF2B5EF4-FFF2-40B4-BE49-F238E27FC236}">
-                  <a16:creationId xmlns:a16="http://schemas.microsoft.com/office/drawing/2014/main" id="{29468657-A9E9-4B52-B87C-8354E4B7D49A}"/>
-                </a:ext>
-              </a:extLst>
-            </p:cNvPr>
-            <p:cNvCxnSpPr>
-              <a:cxnSpLocks/>
-            </p:cNvCxnSpPr>
-            <p:nvPr/>
-          </p:nvCxnSpPr>
-          <p:spPr>
-            <a:xfrm flipH="1">
-              <a:off x="7034160" y="2564568"/>
-              <a:ext cx="1" cy="501805"/>
-            </a:xfrm>
-            <a:prstGeom prst="straightConnector1">
-              <a:avLst/>
-            </a:prstGeom>
-            <a:ln w="28575">
-              <a:tailEnd type="triangle"/>
-            </a:ln>
-          </p:spPr>
-          <p:style>
-            <a:lnRef idx="1">
-              <a:schemeClr val="dk1"/>
-            </a:lnRef>
-            <a:fillRef idx="0">
-              <a:schemeClr val="dk1"/>
-            </a:fillRef>
-            <a:effectRef idx="0">
-              <a:schemeClr val="dk1"/>
-            </a:effectRef>
-            <a:fontRef idx="minor">
-              <a:schemeClr val="tx1"/>
-            </a:fontRef>
-          </p:style>
-        </p:cxnSp>
-        <p:sp>
-          <p:nvSpPr>
-            <p:cNvPr id="10" name="TextBox 9">
-              <a:extLst>
-                <a:ext uri="{FF2B5EF4-FFF2-40B4-BE49-F238E27FC236}">
-                  <a16:creationId xmlns:a16="http://schemas.microsoft.com/office/drawing/2014/main" id="{C8B3C422-50A5-43D5-B18E-C08429C9F317}"/>
-                </a:ext>
-              </a:extLst>
-            </p:cNvPr>
-            <p:cNvSpPr txBox="1"/>
-            <p:nvPr/>
-          </p:nvSpPr>
-          <p:spPr>
-            <a:xfrm>
-              <a:off x="3896221" y="3066373"/>
-              <a:ext cx="1382751" cy="923330"/>
-            </a:xfrm>
-            <a:prstGeom prst="rect">
-              <a:avLst/>
-            </a:prstGeom>
-            <a:noFill/>
-          </p:spPr>
-          <p:txBody>
-            <a:bodyPr wrap="square" rtlCol="0">
-              <a:spAutoFit/>
-            </a:bodyPr>
-            <a:lstStyle/>
-            <a:p>
-              <a:pPr algn="ctr"/>
-              <a:r>
-                <a:rPr lang="en-US" b="1" dirty="0">
-                  <a:solidFill>
-                    <a:srgbClr val="00B050"/>
-                  </a:solidFill>
-                </a:rPr>
-                <a:t>Bagging</a:t>
-              </a:r>
-              <a:r>
-                <a:rPr lang="en-US" dirty="0"/>
-                <a:t> (Bootstrap aggregation)</a:t>
-              </a:r>
-            </a:p>
-          </p:txBody>
-        </p:sp>
-        <p:sp>
-          <p:nvSpPr>
-            <p:cNvPr id="11" name="TextBox 10">
-              <a:extLst>
-                <a:ext uri="{FF2B5EF4-FFF2-40B4-BE49-F238E27FC236}">
-                  <a16:creationId xmlns:a16="http://schemas.microsoft.com/office/drawing/2014/main" id="{8B13CAF6-0AA2-4F7F-968A-C85B5926754E}"/>
-                </a:ext>
-              </a:extLst>
-            </p:cNvPr>
-            <p:cNvSpPr txBox="1"/>
-            <p:nvPr/>
-          </p:nvSpPr>
-          <p:spPr>
-            <a:xfrm>
-              <a:off x="6342784" y="3121351"/>
-              <a:ext cx="1382751" cy="369332"/>
-            </a:xfrm>
-            <a:prstGeom prst="rect">
-              <a:avLst/>
-            </a:prstGeom>
-            <a:noFill/>
-          </p:spPr>
-          <p:txBody>
-            <a:bodyPr wrap="square" rtlCol="0">
-              <a:spAutoFit/>
-            </a:bodyPr>
-            <a:lstStyle/>
-            <a:p>
-              <a:pPr algn="ctr"/>
-              <a:r>
-                <a:rPr lang="en-US" b="1" dirty="0">
-                  <a:solidFill>
-                    <a:srgbClr val="FF0000"/>
-                  </a:solidFill>
-                </a:rPr>
-                <a:t>Boosting</a:t>
-              </a:r>
-              <a:endParaRPr lang="en-US" dirty="0">
+          <a:prstGeom prst="rect">
+            <a:avLst/>
+          </a:prstGeom>
+          <a:noFill/>
+        </p:spPr>
+        <p:txBody>
+          <a:bodyPr wrap="none" rtlCol="0">
+            <a:spAutoFit/>
+          </a:bodyPr>
+          <a:lstStyle/>
+          <a:p>
+            <a:r>
+              <a:rPr lang="en-US" sz="2000" b="1" dirty="0"/>
+              <a:t>Ensemble Technique</a:t>
+            </a:r>
+          </a:p>
+        </p:txBody>
+      </p:sp>
+      <p:cxnSp>
+        <p:nvCxnSpPr>
+          <p:cNvPr id="6" name="Straight Arrow Connector 5">
+            <a:extLst>
+              <a:ext uri="{FF2B5EF4-FFF2-40B4-BE49-F238E27FC236}">
+                <a16:creationId xmlns:a16="http://schemas.microsoft.com/office/drawing/2014/main" id="{7B0EC243-D8A7-4F2A-A096-CEE341E8B716}"/>
+              </a:ext>
+            </a:extLst>
+          </p:cNvPr>
+          <p:cNvCxnSpPr>
+            <a:cxnSpLocks/>
+            <a:stCxn id="5" idx="2"/>
+          </p:cNvCxnSpPr>
+          <p:nvPr/>
+        </p:nvCxnSpPr>
+        <p:spPr>
+          <a:xfrm>
+            <a:off x="4723385" y="4252564"/>
+            <a:ext cx="0" cy="347022"/>
+          </a:xfrm>
+          <a:prstGeom prst="straightConnector1">
+            <a:avLst/>
+          </a:prstGeom>
+          <a:ln w="28575">
+            <a:tailEnd type="triangle"/>
+          </a:ln>
+        </p:spPr>
+        <p:style>
+          <a:lnRef idx="1">
+            <a:schemeClr val="dk1"/>
+          </a:lnRef>
+          <a:fillRef idx="0">
+            <a:schemeClr val="dk1"/>
+          </a:fillRef>
+          <a:effectRef idx="0">
+            <a:schemeClr val="dk1"/>
+          </a:effectRef>
+          <a:fontRef idx="minor">
+            <a:schemeClr val="tx1"/>
+          </a:fontRef>
+        </p:style>
+      </p:cxnSp>
+      <p:cxnSp>
+        <p:nvCxnSpPr>
+          <p:cNvPr id="7" name="Straight Connector 6">
+            <a:extLst>
+              <a:ext uri="{FF2B5EF4-FFF2-40B4-BE49-F238E27FC236}">
+                <a16:creationId xmlns:a16="http://schemas.microsoft.com/office/drawing/2014/main" id="{09DC0F98-3B00-4B2E-A863-7F9B6B174277}"/>
+              </a:ext>
+            </a:extLst>
+          </p:cNvPr>
+          <p:cNvCxnSpPr>
+            <a:cxnSpLocks/>
+          </p:cNvCxnSpPr>
+          <p:nvPr/>
+        </p:nvCxnSpPr>
+        <p:spPr>
+          <a:xfrm>
+            <a:off x="2800350" y="4627756"/>
+            <a:ext cx="3977334" cy="0"/>
+          </a:xfrm>
+          <a:prstGeom prst="line">
+            <a:avLst/>
+          </a:prstGeom>
+          <a:ln w="28575"/>
+        </p:spPr>
+        <p:style>
+          <a:lnRef idx="1">
+            <a:schemeClr val="dk1"/>
+          </a:lnRef>
+          <a:fillRef idx="0">
+            <a:schemeClr val="dk1"/>
+          </a:fillRef>
+          <a:effectRef idx="0">
+            <a:schemeClr val="dk1"/>
+          </a:effectRef>
+          <a:fontRef idx="minor">
+            <a:schemeClr val="tx1"/>
+          </a:fontRef>
+        </p:style>
+      </p:cxnSp>
+      <p:cxnSp>
+        <p:nvCxnSpPr>
+          <p:cNvPr id="8" name="Straight Arrow Connector 7">
+            <a:extLst>
+              <a:ext uri="{FF2B5EF4-FFF2-40B4-BE49-F238E27FC236}">
+                <a16:creationId xmlns:a16="http://schemas.microsoft.com/office/drawing/2014/main" id="{4E932C22-50D9-4301-8DE3-46F60F33F292}"/>
+              </a:ext>
+            </a:extLst>
+          </p:cNvPr>
+          <p:cNvCxnSpPr/>
+          <p:nvPr/>
+        </p:nvCxnSpPr>
+        <p:spPr>
+          <a:xfrm>
+            <a:off x="2800350" y="4627756"/>
+            <a:ext cx="0" cy="501805"/>
+          </a:xfrm>
+          <a:prstGeom prst="straightConnector1">
+            <a:avLst/>
+          </a:prstGeom>
+          <a:ln w="28575">
+            <a:tailEnd type="triangle"/>
+          </a:ln>
+        </p:spPr>
+        <p:style>
+          <a:lnRef idx="1">
+            <a:schemeClr val="dk1"/>
+          </a:lnRef>
+          <a:fillRef idx="0">
+            <a:schemeClr val="dk1"/>
+          </a:fillRef>
+          <a:effectRef idx="0">
+            <a:schemeClr val="dk1"/>
+          </a:effectRef>
+          <a:fontRef idx="minor">
+            <a:schemeClr val="tx1"/>
+          </a:fontRef>
+        </p:style>
+      </p:cxnSp>
+      <p:cxnSp>
+        <p:nvCxnSpPr>
+          <p:cNvPr id="9" name="Straight Arrow Connector 8">
+            <a:extLst>
+              <a:ext uri="{FF2B5EF4-FFF2-40B4-BE49-F238E27FC236}">
+                <a16:creationId xmlns:a16="http://schemas.microsoft.com/office/drawing/2014/main" id="{29468657-A9E9-4B52-B87C-8354E4B7D49A}"/>
+              </a:ext>
+            </a:extLst>
+          </p:cNvPr>
+          <p:cNvCxnSpPr>
+            <a:cxnSpLocks/>
+          </p:cNvCxnSpPr>
+          <p:nvPr/>
+        </p:nvCxnSpPr>
+        <p:spPr>
+          <a:xfrm flipH="1">
+            <a:off x="6773369" y="4640688"/>
+            <a:ext cx="1" cy="501805"/>
+          </a:xfrm>
+          <a:prstGeom prst="straightConnector1">
+            <a:avLst/>
+          </a:prstGeom>
+          <a:ln w="28575">
+            <a:tailEnd type="triangle"/>
+          </a:ln>
+        </p:spPr>
+        <p:style>
+          <a:lnRef idx="1">
+            <a:schemeClr val="dk1"/>
+          </a:lnRef>
+          <a:fillRef idx="0">
+            <a:schemeClr val="dk1"/>
+          </a:fillRef>
+          <a:effectRef idx="0">
+            <a:schemeClr val="dk1"/>
+          </a:effectRef>
+          <a:fontRef idx="minor">
+            <a:schemeClr val="tx1"/>
+          </a:fontRef>
+        </p:style>
+      </p:cxnSp>
+      <p:sp>
+        <p:nvSpPr>
+          <p:cNvPr id="10" name="TextBox 9">
+            <a:extLst>
+              <a:ext uri="{FF2B5EF4-FFF2-40B4-BE49-F238E27FC236}">
+                <a16:creationId xmlns:a16="http://schemas.microsoft.com/office/drawing/2014/main" id="{C8B3C422-50A5-43D5-B18E-C08429C9F317}"/>
+              </a:ext>
+            </a:extLst>
+          </p:cNvPr>
+          <p:cNvSpPr txBox="1"/>
+          <p:nvPr/>
+        </p:nvSpPr>
+        <p:spPr>
+          <a:xfrm>
+            <a:off x="2159734" y="5113454"/>
+            <a:ext cx="1382751" cy="923330"/>
+          </a:xfrm>
+          <a:prstGeom prst="rect">
+            <a:avLst/>
+          </a:prstGeom>
+          <a:noFill/>
+        </p:spPr>
+        <p:txBody>
+          <a:bodyPr wrap="square" rtlCol="0">
+            <a:spAutoFit/>
+          </a:bodyPr>
+          <a:lstStyle/>
+          <a:p>
+            <a:pPr algn="ctr"/>
+            <a:r>
+              <a:rPr lang="en-US" b="1" dirty="0">
+                <a:solidFill>
+                  <a:srgbClr val="00B050"/>
+                </a:solidFill>
+              </a:rPr>
+              <a:t>Bagging</a:t>
+            </a:r>
+            <a:r>
+              <a:rPr lang="en-US" dirty="0"/>
+              <a:t> (Bootstrap aggregation)</a:t>
+            </a:r>
+          </a:p>
+        </p:txBody>
+      </p:sp>
+      <p:sp>
+        <p:nvSpPr>
+          <p:cNvPr id="11" name="TextBox 10">
+            <a:extLst>
+              <a:ext uri="{FF2B5EF4-FFF2-40B4-BE49-F238E27FC236}">
+                <a16:creationId xmlns:a16="http://schemas.microsoft.com/office/drawing/2014/main" id="{8B13CAF6-0AA2-4F7F-968A-C85B5926754E}"/>
+              </a:ext>
+            </a:extLst>
+          </p:cNvPr>
+          <p:cNvSpPr txBox="1"/>
+          <p:nvPr/>
+        </p:nvSpPr>
+        <p:spPr>
+          <a:xfrm>
+            <a:off x="6086307" y="5162024"/>
+            <a:ext cx="1382751" cy="369332"/>
+          </a:xfrm>
+          <a:prstGeom prst="rect">
+            <a:avLst/>
+          </a:prstGeom>
+          <a:noFill/>
+        </p:spPr>
+        <p:txBody>
+          <a:bodyPr wrap="square" rtlCol="0">
+            <a:spAutoFit/>
+          </a:bodyPr>
+          <a:lstStyle/>
+          <a:p>
+            <a:pPr algn="ctr"/>
+            <a:r>
+              <a:rPr lang="en-US" b="1" dirty="0">
                 <a:solidFill>
                   <a:srgbClr val="FF0000"/>
                 </a:solidFill>
-              </a:endParaRPr>
-            </a:p>
-          </p:txBody>
-        </p:sp>
-      </p:grpSp>
+              </a:rPr>
+              <a:t>Boosting</a:t>
+            </a:r>
+            <a:endParaRPr lang="en-US" dirty="0">
+              <a:solidFill>
+                <a:srgbClr val="FF0000"/>
+              </a:solidFill>
+            </a:endParaRPr>
+          </a:p>
+        </p:txBody>
+      </p:sp>
+      <p:cxnSp>
+        <p:nvCxnSpPr>
+          <p:cNvPr id="14" name="Straight Connector 13">
+            <a:extLst>
+              <a:ext uri="{FF2B5EF4-FFF2-40B4-BE49-F238E27FC236}">
+                <a16:creationId xmlns:a16="http://schemas.microsoft.com/office/drawing/2014/main" id="{4BC79E06-2954-4A01-93A8-A4ED8FF8EDBD}"/>
+              </a:ext>
+            </a:extLst>
+          </p:cNvPr>
+          <p:cNvCxnSpPr>
+            <a:cxnSpLocks/>
+          </p:cNvCxnSpPr>
+          <p:nvPr/>
+        </p:nvCxnSpPr>
+        <p:spPr>
+          <a:xfrm>
+            <a:off x="7887994" y="4480998"/>
+            <a:ext cx="0" cy="1731384"/>
+          </a:xfrm>
+          <a:prstGeom prst="line">
+            <a:avLst/>
+          </a:prstGeom>
+          <a:ln w="28575"/>
+        </p:spPr>
+        <p:style>
+          <a:lnRef idx="1">
+            <a:schemeClr val="dk1"/>
+          </a:lnRef>
+          <a:fillRef idx="0">
+            <a:schemeClr val="dk1"/>
+          </a:fillRef>
+          <a:effectRef idx="0">
+            <a:schemeClr val="dk1"/>
+          </a:effectRef>
+          <a:fontRef idx="minor">
+            <a:schemeClr val="tx1"/>
+          </a:fontRef>
+        </p:style>
+      </p:cxnSp>
+      <p:cxnSp>
+        <p:nvCxnSpPr>
+          <p:cNvPr id="17" name="Straight Arrow Connector 16">
+            <a:extLst>
+              <a:ext uri="{FF2B5EF4-FFF2-40B4-BE49-F238E27FC236}">
+                <a16:creationId xmlns:a16="http://schemas.microsoft.com/office/drawing/2014/main" id="{619F1A18-FA03-490F-9366-1994C84E58B0}"/>
+              </a:ext>
+            </a:extLst>
+          </p:cNvPr>
+          <p:cNvCxnSpPr>
+            <a:cxnSpLocks/>
+          </p:cNvCxnSpPr>
+          <p:nvPr/>
+        </p:nvCxnSpPr>
+        <p:spPr>
+          <a:xfrm>
+            <a:off x="7315200" y="5364142"/>
+            <a:ext cx="543572" cy="0"/>
+          </a:xfrm>
+          <a:prstGeom prst="straightConnector1">
+            <a:avLst/>
+          </a:prstGeom>
+          <a:ln w="28575">
+            <a:tailEnd type="triangle"/>
+          </a:ln>
+        </p:spPr>
+        <p:style>
+          <a:lnRef idx="1">
+            <a:schemeClr val="dk1"/>
+          </a:lnRef>
+          <a:fillRef idx="0">
+            <a:schemeClr val="dk1"/>
+          </a:fillRef>
+          <a:effectRef idx="0">
+            <a:schemeClr val="dk1"/>
+          </a:effectRef>
+          <a:fontRef idx="minor">
+            <a:schemeClr val="tx1"/>
+          </a:fontRef>
+        </p:style>
+      </p:cxnSp>
+      <p:cxnSp>
+        <p:nvCxnSpPr>
+          <p:cNvPr id="22" name="Straight Arrow Connector 21">
+            <a:extLst>
+              <a:ext uri="{FF2B5EF4-FFF2-40B4-BE49-F238E27FC236}">
+                <a16:creationId xmlns:a16="http://schemas.microsoft.com/office/drawing/2014/main" id="{B7A674E3-93B3-4F67-8EB8-79F45853DC82}"/>
+              </a:ext>
+            </a:extLst>
+          </p:cNvPr>
+          <p:cNvCxnSpPr>
+            <a:cxnSpLocks/>
+          </p:cNvCxnSpPr>
+          <p:nvPr/>
+        </p:nvCxnSpPr>
+        <p:spPr>
+          <a:xfrm>
+            <a:off x="7887994" y="4482565"/>
+            <a:ext cx="543572" cy="0"/>
+          </a:xfrm>
+          <a:prstGeom prst="straightConnector1">
+            <a:avLst/>
+          </a:prstGeom>
+          <a:ln w="28575">
+            <a:tailEnd type="triangle"/>
+          </a:ln>
+        </p:spPr>
+        <p:style>
+          <a:lnRef idx="1">
+            <a:schemeClr val="dk1"/>
+          </a:lnRef>
+          <a:fillRef idx="0">
+            <a:schemeClr val="dk1"/>
+          </a:fillRef>
+          <a:effectRef idx="0">
+            <a:schemeClr val="dk1"/>
+          </a:effectRef>
+          <a:fontRef idx="minor">
+            <a:schemeClr val="tx1"/>
+          </a:fontRef>
+        </p:style>
+      </p:cxnSp>
+      <p:cxnSp>
+        <p:nvCxnSpPr>
+          <p:cNvPr id="23" name="Straight Arrow Connector 22">
+            <a:extLst>
+              <a:ext uri="{FF2B5EF4-FFF2-40B4-BE49-F238E27FC236}">
+                <a16:creationId xmlns:a16="http://schemas.microsoft.com/office/drawing/2014/main" id="{841F8391-117B-4318-BDB1-B5AE00BECB41}"/>
+              </a:ext>
+            </a:extLst>
+          </p:cNvPr>
+          <p:cNvCxnSpPr>
+            <a:cxnSpLocks/>
+          </p:cNvCxnSpPr>
+          <p:nvPr/>
+        </p:nvCxnSpPr>
+        <p:spPr>
+          <a:xfrm>
+            <a:off x="7887994" y="5346690"/>
+            <a:ext cx="543572" cy="0"/>
+          </a:xfrm>
+          <a:prstGeom prst="straightConnector1">
+            <a:avLst/>
+          </a:prstGeom>
+          <a:ln w="28575">
+            <a:tailEnd type="triangle"/>
+          </a:ln>
+        </p:spPr>
+        <p:style>
+          <a:lnRef idx="1">
+            <a:schemeClr val="dk1"/>
+          </a:lnRef>
+          <a:fillRef idx="0">
+            <a:schemeClr val="dk1"/>
+          </a:fillRef>
+          <a:effectRef idx="0">
+            <a:schemeClr val="dk1"/>
+          </a:effectRef>
+          <a:fontRef idx="minor">
+            <a:schemeClr val="tx1"/>
+          </a:fontRef>
+        </p:style>
+      </p:cxnSp>
+      <p:cxnSp>
+        <p:nvCxnSpPr>
+          <p:cNvPr id="24" name="Straight Arrow Connector 23">
+            <a:extLst>
+              <a:ext uri="{FF2B5EF4-FFF2-40B4-BE49-F238E27FC236}">
+                <a16:creationId xmlns:a16="http://schemas.microsoft.com/office/drawing/2014/main" id="{40D6A459-8159-490F-80A9-00ED6982A4E9}"/>
+              </a:ext>
+            </a:extLst>
+          </p:cNvPr>
+          <p:cNvCxnSpPr>
+            <a:cxnSpLocks/>
+          </p:cNvCxnSpPr>
+          <p:nvPr/>
+        </p:nvCxnSpPr>
+        <p:spPr>
+          <a:xfrm>
+            <a:off x="7887994" y="6210815"/>
+            <a:ext cx="543572" cy="0"/>
+          </a:xfrm>
+          <a:prstGeom prst="straightConnector1">
+            <a:avLst/>
+          </a:prstGeom>
+          <a:ln w="28575">
+            <a:tailEnd type="triangle"/>
+          </a:ln>
+        </p:spPr>
+        <p:style>
+          <a:lnRef idx="1">
+            <a:schemeClr val="dk1"/>
+          </a:lnRef>
+          <a:fillRef idx="0">
+            <a:schemeClr val="dk1"/>
+          </a:fillRef>
+          <a:effectRef idx="0">
+            <a:schemeClr val="dk1"/>
+          </a:effectRef>
+          <a:fontRef idx="minor">
+            <a:schemeClr val="tx1"/>
+          </a:fontRef>
+        </p:style>
+      </p:cxnSp>
+      <p:sp>
+        <p:nvSpPr>
+          <p:cNvPr id="25" name="TextBox 24">
+            <a:extLst>
+              <a:ext uri="{FF2B5EF4-FFF2-40B4-BE49-F238E27FC236}">
+                <a16:creationId xmlns:a16="http://schemas.microsoft.com/office/drawing/2014/main" id="{98E9A759-2164-4B41-973B-E558077785F4}"/>
+              </a:ext>
+            </a:extLst>
+          </p:cNvPr>
+          <p:cNvSpPr txBox="1"/>
+          <p:nvPr/>
+        </p:nvSpPr>
+        <p:spPr>
+          <a:xfrm>
+            <a:off x="8431566" y="4302134"/>
+            <a:ext cx="3517758" cy="338554"/>
+          </a:xfrm>
+          <a:prstGeom prst="rect">
+            <a:avLst/>
+          </a:prstGeom>
+          <a:noFill/>
+        </p:spPr>
+        <p:txBody>
+          <a:bodyPr wrap="none" rtlCol="0">
+            <a:spAutoFit/>
+          </a:bodyPr>
+          <a:lstStyle/>
+          <a:p>
+            <a:r>
+              <a:rPr lang="en-GB" sz="1600" b="1" dirty="0"/>
+              <a:t>Ada-Boost (Regression &amp; Classification)</a:t>
+            </a:r>
+          </a:p>
+        </p:txBody>
+      </p:sp>
+      <p:sp>
+        <p:nvSpPr>
+          <p:cNvPr id="26" name="TextBox 25">
+            <a:extLst>
+              <a:ext uri="{FF2B5EF4-FFF2-40B4-BE49-F238E27FC236}">
+                <a16:creationId xmlns:a16="http://schemas.microsoft.com/office/drawing/2014/main" id="{21829E4C-FA03-499A-BF23-8DBF5A39801F}"/>
+              </a:ext>
+            </a:extLst>
+          </p:cNvPr>
+          <p:cNvSpPr txBox="1"/>
+          <p:nvPr/>
+        </p:nvSpPr>
+        <p:spPr>
+          <a:xfrm>
+            <a:off x="8431566" y="5107046"/>
+            <a:ext cx="3418885" cy="338554"/>
+          </a:xfrm>
+          <a:prstGeom prst="rect">
+            <a:avLst/>
+          </a:prstGeom>
+          <a:noFill/>
+        </p:spPr>
+        <p:txBody>
+          <a:bodyPr wrap="none" rtlCol="0">
+            <a:spAutoFit/>
+          </a:bodyPr>
+          <a:lstStyle/>
+          <a:p>
+            <a:r>
+              <a:rPr lang="en-GB" sz="1600" b="1" dirty="0"/>
+              <a:t>XG-Boost (Regression &amp; Classification)</a:t>
+            </a:r>
+          </a:p>
+        </p:txBody>
+      </p:sp>
+      <p:sp>
+        <p:nvSpPr>
+          <p:cNvPr id="27" name="TextBox 26">
+            <a:extLst>
+              <a:ext uri="{FF2B5EF4-FFF2-40B4-BE49-F238E27FC236}">
+                <a16:creationId xmlns:a16="http://schemas.microsoft.com/office/drawing/2014/main" id="{158BC27A-E7F3-482D-BE9A-6A1203F6F2BC}"/>
+              </a:ext>
+            </a:extLst>
+          </p:cNvPr>
+          <p:cNvSpPr txBox="1"/>
+          <p:nvPr/>
+        </p:nvSpPr>
+        <p:spPr>
+          <a:xfrm>
+            <a:off x="8431565" y="6030376"/>
+            <a:ext cx="3670685" cy="307777"/>
+          </a:xfrm>
+          <a:prstGeom prst="rect">
+            <a:avLst/>
+          </a:prstGeom>
+          <a:noFill/>
+        </p:spPr>
+        <p:txBody>
+          <a:bodyPr wrap="none" rtlCol="0">
+            <a:spAutoFit/>
+          </a:bodyPr>
+          <a:lstStyle/>
+          <a:p>
+            <a:r>
+              <a:rPr lang="en-GB" sz="1400" b="1" dirty="0"/>
+              <a:t>Gradient Boosting (Regression &amp; Classification)</a:t>
+            </a:r>
+          </a:p>
+        </p:txBody>
+      </p:sp>
+      <p:cxnSp>
+        <p:nvCxnSpPr>
+          <p:cNvPr id="29" name="Straight Arrow Connector 28">
+            <a:extLst>
+              <a:ext uri="{FF2B5EF4-FFF2-40B4-BE49-F238E27FC236}">
+                <a16:creationId xmlns:a16="http://schemas.microsoft.com/office/drawing/2014/main" id="{BFAE60BE-2955-49A5-B83C-0C590197C5E2}"/>
+              </a:ext>
+            </a:extLst>
+          </p:cNvPr>
+          <p:cNvCxnSpPr/>
+          <p:nvPr/>
+        </p:nvCxnSpPr>
+        <p:spPr>
+          <a:xfrm>
+            <a:off x="3938587" y="4611649"/>
+            <a:ext cx="0" cy="501805"/>
+          </a:xfrm>
+          <a:prstGeom prst="straightConnector1">
+            <a:avLst/>
+          </a:prstGeom>
+          <a:ln w="28575">
+            <a:tailEnd type="triangle"/>
+          </a:ln>
+        </p:spPr>
+        <p:style>
+          <a:lnRef idx="1">
+            <a:schemeClr val="dk1"/>
+          </a:lnRef>
+          <a:fillRef idx="0">
+            <a:schemeClr val="dk1"/>
+          </a:fillRef>
+          <a:effectRef idx="0">
+            <a:schemeClr val="dk1"/>
+          </a:effectRef>
+          <a:fontRef idx="minor">
+            <a:schemeClr val="tx1"/>
+          </a:fontRef>
+        </p:style>
+      </p:cxnSp>
+      <p:cxnSp>
+        <p:nvCxnSpPr>
+          <p:cNvPr id="30" name="Straight Arrow Connector 29">
+            <a:extLst>
+              <a:ext uri="{FF2B5EF4-FFF2-40B4-BE49-F238E27FC236}">
+                <a16:creationId xmlns:a16="http://schemas.microsoft.com/office/drawing/2014/main" id="{CB1DB944-99AC-475D-AE4E-09B72C5AADEE}"/>
+              </a:ext>
+            </a:extLst>
+          </p:cNvPr>
+          <p:cNvCxnSpPr/>
+          <p:nvPr/>
+        </p:nvCxnSpPr>
+        <p:spPr>
+          <a:xfrm>
+            <a:off x="5376862" y="4640687"/>
+            <a:ext cx="0" cy="501805"/>
+          </a:xfrm>
+          <a:prstGeom prst="straightConnector1">
+            <a:avLst/>
+          </a:prstGeom>
+          <a:ln w="28575">
+            <a:tailEnd type="triangle"/>
+          </a:ln>
+        </p:spPr>
+        <p:style>
+          <a:lnRef idx="1">
+            <a:schemeClr val="dk1"/>
+          </a:lnRef>
+          <a:fillRef idx="0">
+            <a:schemeClr val="dk1"/>
+          </a:fillRef>
+          <a:effectRef idx="0">
+            <a:schemeClr val="dk1"/>
+          </a:effectRef>
+          <a:fontRef idx="minor">
+            <a:schemeClr val="tx1"/>
+          </a:fontRef>
+        </p:style>
+      </p:cxnSp>
+      <p:sp>
+        <p:nvSpPr>
+          <p:cNvPr id="31" name="TextBox 30">
+            <a:extLst>
+              <a:ext uri="{FF2B5EF4-FFF2-40B4-BE49-F238E27FC236}">
+                <a16:creationId xmlns:a16="http://schemas.microsoft.com/office/drawing/2014/main" id="{25547107-09C9-4445-A095-2FD0A2EB4338}"/>
+              </a:ext>
+            </a:extLst>
+          </p:cNvPr>
+          <p:cNvSpPr txBox="1"/>
+          <p:nvPr/>
+        </p:nvSpPr>
+        <p:spPr>
+          <a:xfrm>
+            <a:off x="3295858" y="5113454"/>
+            <a:ext cx="1382751" cy="369332"/>
+          </a:xfrm>
+          <a:prstGeom prst="rect">
+            <a:avLst/>
+          </a:prstGeom>
+          <a:noFill/>
+        </p:spPr>
+        <p:txBody>
+          <a:bodyPr wrap="square" rtlCol="0">
+            <a:spAutoFit/>
+          </a:bodyPr>
+          <a:lstStyle/>
+          <a:p>
+            <a:pPr algn="ctr"/>
+            <a:r>
+              <a:rPr lang="en-US" b="1" dirty="0">
+                <a:solidFill>
+                  <a:srgbClr val="00B0F0"/>
+                </a:solidFill>
+              </a:rPr>
+              <a:t>Voting</a:t>
+            </a:r>
+            <a:endParaRPr lang="en-US" dirty="0">
+              <a:solidFill>
+                <a:srgbClr val="00B0F0"/>
+              </a:solidFill>
+            </a:endParaRPr>
+          </a:p>
+        </p:txBody>
+      </p:sp>
+      <p:sp>
+        <p:nvSpPr>
+          <p:cNvPr id="32" name="TextBox 31">
+            <a:extLst>
+              <a:ext uri="{FF2B5EF4-FFF2-40B4-BE49-F238E27FC236}">
+                <a16:creationId xmlns:a16="http://schemas.microsoft.com/office/drawing/2014/main" id="{F9C553EA-1A3C-43CE-905C-C2CE8F0A376A}"/>
+              </a:ext>
+            </a:extLst>
+          </p:cNvPr>
+          <p:cNvSpPr txBox="1"/>
+          <p:nvPr/>
+        </p:nvSpPr>
+        <p:spPr>
+          <a:xfrm>
+            <a:off x="4619997" y="5094791"/>
+            <a:ext cx="1382751" cy="369332"/>
+          </a:xfrm>
+          <a:prstGeom prst="rect">
+            <a:avLst/>
+          </a:prstGeom>
+          <a:noFill/>
+        </p:spPr>
+        <p:txBody>
+          <a:bodyPr wrap="square" rtlCol="0">
+            <a:spAutoFit/>
+          </a:bodyPr>
+          <a:lstStyle/>
+          <a:p>
+            <a:pPr algn="ctr"/>
+            <a:r>
+              <a:rPr lang="en-US" b="1" dirty="0">
+                <a:solidFill>
+                  <a:srgbClr val="00B0F0"/>
+                </a:solidFill>
+              </a:rPr>
+              <a:t>Stacking</a:t>
+            </a:r>
+            <a:endParaRPr lang="en-US" dirty="0">
+              <a:solidFill>
+                <a:srgbClr val="00B0F0"/>
+              </a:solidFill>
+            </a:endParaRPr>
+          </a:p>
+        </p:txBody>
+      </p:sp>
     </p:spTree>
     <p:extLst>
       <p:ext uri="{BB962C8B-B14F-4D97-AF65-F5344CB8AC3E}">

</xml_diff>